<commit_message>
Added github address to ppt
</commit_message>
<xml_diff>
--- a/tensorflow-introduction.pptx
+++ b/tensorflow-introduction.pptx
@@ -137,6 +137,11 @@
       </a:defRPr>
     </a:lvl9pPr>
   </p:defaultTextStyle>
+  <p:extLst>
+    <p:ext uri="{EFAFB233-063F-42B5-8137-9DF3F51BA10A}">
+      <p15:sldGuideLst xmlns:p15="http://schemas.microsoft.com/office/powerpoint/2012/main"/>
+    </p:ext>
+  </p:extLst>
 </p:presentation>
 </file>
 
@@ -271,7 +276,7 @@
           <a:p>
             <a:fld id="{1453E98D-6E8F-2A42-80C6-515101F0BF0C}" type="datetimeFigureOut">
               <a:rPr lang="en-US" smtClean="0"/>
-              <a:t>7/9/18</a:t>
+              <a:t>8/2/18</a:t>
             </a:fld>
             <a:endParaRPr lang="en-US"/>
           </a:p>
@@ -441,7 +446,7 @@
           <a:p>
             <a:fld id="{1453E98D-6E8F-2A42-80C6-515101F0BF0C}" type="datetimeFigureOut">
               <a:rPr lang="en-US" smtClean="0"/>
-              <a:t>7/9/18</a:t>
+              <a:t>8/2/18</a:t>
             </a:fld>
             <a:endParaRPr lang="en-US"/>
           </a:p>
@@ -621,7 +626,7 @@
           <a:p>
             <a:fld id="{1453E98D-6E8F-2A42-80C6-515101F0BF0C}" type="datetimeFigureOut">
               <a:rPr lang="en-US" smtClean="0"/>
-              <a:t>7/9/18</a:t>
+              <a:t>8/2/18</a:t>
             </a:fld>
             <a:endParaRPr lang="en-US"/>
           </a:p>
@@ -791,7 +796,7 @@
           <a:p>
             <a:fld id="{1453E98D-6E8F-2A42-80C6-515101F0BF0C}" type="datetimeFigureOut">
               <a:rPr lang="en-US" smtClean="0"/>
-              <a:t>7/9/18</a:t>
+              <a:t>8/2/18</a:t>
             </a:fld>
             <a:endParaRPr lang="en-US"/>
           </a:p>
@@ -1037,7 +1042,7 @@
           <a:p>
             <a:fld id="{1453E98D-6E8F-2A42-80C6-515101F0BF0C}" type="datetimeFigureOut">
               <a:rPr lang="en-US" smtClean="0"/>
-              <a:t>7/9/18</a:t>
+              <a:t>8/2/18</a:t>
             </a:fld>
             <a:endParaRPr lang="en-US"/>
           </a:p>
@@ -1269,7 +1274,7 @@
           <a:p>
             <a:fld id="{1453E98D-6E8F-2A42-80C6-515101F0BF0C}" type="datetimeFigureOut">
               <a:rPr lang="en-US" smtClean="0"/>
-              <a:t>7/9/18</a:t>
+              <a:t>8/2/18</a:t>
             </a:fld>
             <a:endParaRPr lang="en-US"/>
           </a:p>
@@ -1636,7 +1641,7 @@
           <a:p>
             <a:fld id="{1453E98D-6E8F-2A42-80C6-515101F0BF0C}" type="datetimeFigureOut">
               <a:rPr lang="en-US" smtClean="0"/>
-              <a:t>7/9/18</a:t>
+              <a:t>8/2/18</a:t>
             </a:fld>
             <a:endParaRPr lang="en-US"/>
           </a:p>
@@ -1754,7 +1759,7 @@
           <a:p>
             <a:fld id="{1453E98D-6E8F-2A42-80C6-515101F0BF0C}" type="datetimeFigureOut">
               <a:rPr lang="en-US" smtClean="0"/>
-              <a:t>7/9/18</a:t>
+              <a:t>8/2/18</a:t>
             </a:fld>
             <a:endParaRPr lang="en-US"/>
           </a:p>
@@ -1849,7 +1854,7 @@
           <a:p>
             <a:fld id="{1453E98D-6E8F-2A42-80C6-515101F0BF0C}" type="datetimeFigureOut">
               <a:rPr lang="en-US" smtClean="0"/>
-              <a:t>7/9/18</a:t>
+              <a:t>8/2/18</a:t>
             </a:fld>
             <a:endParaRPr lang="en-US"/>
           </a:p>
@@ -2126,7 +2131,7 @@
           <a:p>
             <a:fld id="{1453E98D-6E8F-2A42-80C6-515101F0BF0C}" type="datetimeFigureOut">
               <a:rPr lang="en-US" smtClean="0"/>
-              <a:t>7/9/18</a:t>
+              <a:t>8/2/18</a:t>
             </a:fld>
             <a:endParaRPr lang="en-US"/>
           </a:p>
@@ -2379,7 +2384,7 @@
           <a:p>
             <a:fld id="{1453E98D-6E8F-2A42-80C6-515101F0BF0C}" type="datetimeFigureOut">
               <a:rPr lang="en-US" smtClean="0"/>
-              <a:t>7/9/18</a:t>
+              <a:t>8/2/18</a:t>
             </a:fld>
             <a:endParaRPr lang="en-US"/>
           </a:p>
@@ -2592,7 +2597,7 @@
           <a:p>
             <a:fld id="{1453E98D-6E8F-2A42-80C6-515101F0BF0C}" type="datetimeFigureOut">
               <a:rPr lang="en-US" smtClean="0"/>
-              <a:t>7/9/18</a:t>
+              <a:t>8/2/18</a:t>
             </a:fld>
             <a:endParaRPr lang="en-US"/>
           </a:p>
@@ -9734,7 +9739,62 @@
                 <a:ea typeface="Andale Mono" charset="0"/>
                 <a:cs typeface="Andale Mono" charset="0"/>
               </a:rPr>
-              <a:t> is very similar to the example in these slides so it can be used as a guide as well. </a:t>
+              <a:t> is very similar to the example in these slides so it </a:t>
+            </a:r>
+            <a:r>
+              <a:rPr lang="en-US" dirty="0" smtClean="0">
+                <a:ea typeface="Andale Mono" charset="0"/>
+                <a:cs typeface="Andale Mono" charset="0"/>
+              </a:rPr>
+              <a:t>can </a:t>
+            </a:r>
+            <a:r>
+              <a:rPr lang="en-US" dirty="0" smtClean="0">
+                <a:ea typeface="Andale Mono" charset="0"/>
+                <a:cs typeface="Andale Mono" charset="0"/>
+              </a:rPr>
+              <a:t>be used as a guide as well. </a:t>
+            </a:r>
+            <a:endParaRPr lang="en-US" dirty="0" smtClean="0">
+              <a:ea typeface="Andale Mono" charset="0"/>
+              <a:cs typeface="Andale Mono" charset="0"/>
+            </a:endParaRPr>
+          </a:p>
+          <a:p>
+            <a:r>
+              <a:rPr lang="en-US" dirty="0">
+                <a:ea typeface="Andale Mono" charset="0"/>
+                <a:cs typeface="Andale Mono" charset="0"/>
+              </a:rPr>
+              <a:t>https://</a:t>
+            </a:r>
+            <a:r>
+              <a:rPr lang="en-US" dirty="0" err="1">
+                <a:ea typeface="Andale Mono" charset="0"/>
+                <a:cs typeface="Andale Mono" charset="0"/>
+              </a:rPr>
+              <a:t>github.com</a:t>
+            </a:r>
+            <a:r>
+              <a:rPr lang="en-US" dirty="0">
+                <a:ea typeface="Andale Mono" charset="0"/>
+                <a:cs typeface="Andale Mono" charset="0"/>
+              </a:rPr>
+              <a:t>/</a:t>
+            </a:r>
+            <a:r>
+              <a:rPr lang="en-US" dirty="0" err="1">
+                <a:ea typeface="Andale Mono" charset="0"/>
+                <a:cs typeface="Andale Mono" charset="0"/>
+              </a:rPr>
+              <a:t>julianClayton</a:t>
+            </a:r>
+            <a:r>
+              <a:rPr lang="en-US">
+                <a:ea typeface="Andale Mono" charset="0"/>
+                <a:cs typeface="Andale Mono" charset="0"/>
+              </a:rPr>
+              <a:t>/Classification-Neural-Network</a:t>
             </a:r>
             <a:endParaRPr lang="en-US" dirty="0">
               <a:ea typeface="Andale Mono" charset="0"/>
@@ -10173,6 +10233,109 @@
                       </p:childTnLst>
                     </p:cTn>
                   </p:par>
+                  <p:par>
+                    <p:cTn id="27" fill="hold">
+                      <p:stCondLst>
+                        <p:cond delay="indefinite"/>
+                      </p:stCondLst>
+                      <p:childTnLst>
+                        <p:par>
+                          <p:cTn id="28" fill="hold">
+                            <p:stCondLst>
+                              <p:cond delay="0"/>
+                            </p:stCondLst>
+                            <p:childTnLst>
+                              <p:par>
+                                <p:cTn id="29" presetID="2" presetClass="entr" presetSubtype="4" fill="hold" grpId="0" nodeType="clickEffect">
+                                  <p:stCondLst>
+                                    <p:cond delay="0"/>
+                                  </p:stCondLst>
+                                  <p:childTnLst>
+                                    <p:set>
+                                      <p:cBhvr>
+                                        <p:cTn id="30" dur="1" fill="hold">
+                                          <p:stCondLst>
+                                            <p:cond delay="0"/>
+                                          </p:stCondLst>
+                                        </p:cTn>
+                                        <p:tgtEl>
+                                          <p:spTgt spid="3">
+                                            <p:txEl>
+                                              <p:pRg st="4" end="4"/>
+                                            </p:txEl>
+                                          </p:spTgt>
+                                        </p:tgtEl>
+                                        <p:attrNameLst>
+                                          <p:attrName>style.visibility</p:attrName>
+                                        </p:attrNameLst>
+                                      </p:cBhvr>
+                                      <p:to>
+                                        <p:strVal val="visible"/>
+                                      </p:to>
+                                    </p:set>
+                                    <p:anim calcmode="lin" valueType="num">
+                                      <p:cBhvr additive="base">
+                                        <p:cTn id="31" dur="500" fill="hold"/>
+                                        <p:tgtEl>
+                                          <p:spTgt spid="3">
+                                            <p:txEl>
+                                              <p:pRg st="4" end="4"/>
+                                            </p:txEl>
+                                          </p:spTgt>
+                                        </p:tgtEl>
+                                        <p:attrNameLst>
+                                          <p:attrName>ppt_x</p:attrName>
+                                        </p:attrNameLst>
+                                      </p:cBhvr>
+                                      <p:tavLst>
+                                        <p:tav tm="0">
+                                          <p:val>
+                                            <p:strVal val="#ppt_x"/>
+                                          </p:val>
+                                        </p:tav>
+                                        <p:tav tm="100000">
+                                          <p:val>
+                                            <p:strVal val="#ppt_x"/>
+                                          </p:val>
+                                        </p:tav>
+                                      </p:tavLst>
+                                    </p:anim>
+                                    <p:anim calcmode="lin" valueType="num">
+                                      <p:cBhvr additive="base">
+                                        <p:cTn id="32" dur="500" fill="hold"/>
+                                        <p:tgtEl>
+                                          <p:spTgt spid="3">
+                                            <p:txEl>
+                                              <p:pRg st="4" end="4"/>
+                                            </p:txEl>
+                                          </p:spTgt>
+                                        </p:tgtEl>
+                                        <p:attrNameLst>
+                                          <p:attrName>ppt_y</p:attrName>
+                                        </p:attrNameLst>
+                                      </p:cBhvr>
+                                      <p:tavLst>
+                                        <p:tav tm="0">
+                                          <p:val>
+                                            <p:strVal val="1+#ppt_h/2"/>
+                                          </p:val>
+                                        </p:tav>
+                                        <p:tav tm="100000">
+                                          <p:val>
+                                            <p:strVal val="#ppt_y"/>
+                                          </p:val>
+                                        </p:tav>
+                                      </p:tavLst>
+                                    </p:anim>
+                                  </p:childTnLst>
+                                </p:cTn>
+                              </p:par>
+                            </p:childTnLst>
+                          </p:cTn>
+                        </p:par>
+                      </p:childTnLst>
+                    </p:cTn>
+                  </p:par>
                 </p:childTnLst>
               </p:cTn>
               <p:prevCondLst>

</xml_diff>